<commit_message>
added training and emergency responders gap analysis
</commit_message>
<xml_diff>
--- a/FindAR/Visualizations/gaps/graph-gaps.pptx
+++ b/FindAR/Visualizations/gaps/graph-gaps.pptx
@@ -5,7 +5,7 @@
     <p:sldMasterId id="2147483648" r:id="rId1"/>
   </p:sldMasterIdLst>
   <p:notesMasterIdLst>
-    <p:notesMasterId r:id="rId13"/>
+    <p:notesMasterId r:id="rId14"/>
   </p:notesMasterIdLst>
   <p:sldIdLst>
     <p:sldId id="260" r:id="rId2"/>
@@ -14,11 +14,12 @@
     <p:sldId id="258" r:id="rId5"/>
     <p:sldId id="261" r:id="rId6"/>
     <p:sldId id="262" r:id="rId7"/>
-    <p:sldId id="263" r:id="rId8"/>
-    <p:sldId id="264" r:id="rId9"/>
-    <p:sldId id="267" r:id="rId10"/>
-    <p:sldId id="265" r:id="rId11"/>
-    <p:sldId id="266" r:id="rId12"/>
+    <p:sldId id="268" r:id="rId8"/>
+    <p:sldId id="263" r:id="rId9"/>
+    <p:sldId id="264" r:id="rId10"/>
+    <p:sldId id="267" r:id="rId11"/>
+    <p:sldId id="265" r:id="rId12"/>
+    <p:sldId id="266" r:id="rId13"/>
   </p:sldIdLst>
   <p:sldSz cx="12192000" cy="6858000"/>
   <p:notesSz cx="6858000" cy="9144000"/>
@@ -5118,6 +5119,160 @@
           </a:fontRef>
         </p:style>
       </p:cxnSp>
+      <p:sp>
+        <p:nvSpPr>
+          <p:cNvPr id="34" name="Rectangle 33">
+            <a:extLst>
+              <a:ext uri="{FF2B5EF4-FFF2-40B4-BE49-F238E27FC236}">
+                <a16:creationId xmlns:a16="http://schemas.microsoft.com/office/drawing/2014/main" id="{ADBD04F0-950D-42C4-9C68-6B07861E1218}"/>
+              </a:ext>
+            </a:extLst>
+          </p:cNvPr>
+          <p:cNvSpPr/>
+          <p:nvPr/>
+        </p:nvSpPr>
+        <p:spPr>
+          <a:xfrm>
+            <a:off x="5700037" y="1057055"/>
+            <a:ext cx="126390" cy="114894"/>
+          </a:xfrm>
+          <a:prstGeom prst="rect">
+            <a:avLst/>
+          </a:prstGeom>
+          <a:noFill/>
+          <a:ln w="38100">
+            <a:solidFill>
+              <a:srgbClr val="FF0000"/>
+            </a:solidFill>
+          </a:ln>
+        </p:spPr>
+        <p:style>
+          <a:lnRef idx="2">
+            <a:schemeClr val="accent1">
+              <a:shade val="50000"/>
+            </a:schemeClr>
+          </a:lnRef>
+          <a:fillRef idx="1">
+            <a:schemeClr val="accent1"/>
+          </a:fillRef>
+          <a:effectRef idx="0">
+            <a:schemeClr val="accent1"/>
+          </a:effectRef>
+          <a:fontRef idx="minor">
+            <a:schemeClr val="lt1"/>
+          </a:fontRef>
+        </p:style>
+        <p:txBody>
+          <a:bodyPr rtlCol="0" anchor="ctr"/>
+          <a:lstStyle/>
+          <a:p>
+            <a:pPr algn="ctr"/>
+            <a:endParaRPr lang="en-US"/>
+          </a:p>
+        </p:txBody>
+      </p:sp>
+      <p:sp>
+        <p:nvSpPr>
+          <p:cNvPr id="35" name="TextBox 34">
+            <a:extLst>
+              <a:ext uri="{FF2B5EF4-FFF2-40B4-BE49-F238E27FC236}">
+                <a16:creationId xmlns:a16="http://schemas.microsoft.com/office/drawing/2014/main" id="{3C5A2DCF-C77B-44E0-A0BC-9F2E9C70C572}"/>
+              </a:ext>
+            </a:extLst>
+          </p:cNvPr>
+          <p:cNvSpPr txBox="1"/>
+          <p:nvPr/>
+        </p:nvSpPr>
+        <p:spPr>
+          <a:xfrm>
+            <a:off x="575733" y="925092"/>
+            <a:ext cx="3586603" cy="369332"/>
+          </a:xfrm>
+          <a:prstGeom prst="rect">
+            <a:avLst/>
+          </a:prstGeom>
+          <a:solidFill>
+            <a:schemeClr val="accent4">
+              <a:lumMod val="20000"/>
+              <a:lumOff val="80000"/>
+            </a:schemeClr>
+          </a:solidFill>
+          <a:ln>
+            <a:solidFill>
+              <a:schemeClr val="bg1">
+                <a:lumMod val="85000"/>
+              </a:schemeClr>
+            </a:solidFill>
+          </a:ln>
+          <a:effectLst>
+            <a:outerShdw blurRad="50800" dist="38100" dir="8100000" algn="tr" rotWithShape="0">
+              <a:prstClr val="black">
+                <a:alpha val="40000"/>
+              </a:prstClr>
+            </a:outerShdw>
+          </a:effectLst>
+        </p:spPr>
+        <p:txBody>
+          <a:bodyPr wrap="square" rtlCol="0">
+            <a:spAutoFit/>
+          </a:bodyPr>
+          <a:lstStyle/>
+          <a:p>
+            <a:pPr algn="r"/>
+            <a:r>
+              <a:rPr lang="en-US" dirty="0"/>
+              <a:t>emergency responders + training</a:t>
+            </a:r>
+          </a:p>
+        </p:txBody>
+      </p:sp>
+      <p:cxnSp>
+        <p:nvCxnSpPr>
+          <p:cNvPr id="37" name="Straight Connector 36">
+            <a:extLst>
+              <a:ext uri="{FF2B5EF4-FFF2-40B4-BE49-F238E27FC236}">
+                <a16:creationId xmlns:a16="http://schemas.microsoft.com/office/drawing/2014/main" id="{317ED951-72C0-48DD-9C8C-08503A0A904C}"/>
+              </a:ext>
+            </a:extLst>
+          </p:cNvPr>
+          <p:cNvCxnSpPr>
+            <a:cxnSpLocks/>
+            <a:stCxn id="35" idx="3"/>
+            <a:endCxn id="34" idx="1"/>
+          </p:cNvCxnSpPr>
+          <p:nvPr/>
+        </p:nvCxnSpPr>
+        <p:spPr>
+          <a:xfrm>
+            <a:off x="4162336" y="1109758"/>
+            <a:ext cx="1537701" cy="4744"/>
+          </a:xfrm>
+          <a:prstGeom prst="line">
+            <a:avLst/>
+          </a:prstGeom>
+          <a:ln>
+            <a:solidFill>
+              <a:schemeClr val="tx1"/>
+            </a:solidFill>
+            <a:headEnd type="oval" w="med" len="med"/>
+            <a:tailEnd type="oval" w="med" len="med"/>
+          </a:ln>
+        </p:spPr>
+        <p:style>
+          <a:lnRef idx="1">
+            <a:schemeClr val="accent1"/>
+          </a:lnRef>
+          <a:fillRef idx="0">
+            <a:schemeClr val="accent1"/>
+          </a:fillRef>
+          <a:effectRef idx="0">
+            <a:schemeClr val="accent1"/>
+          </a:effectRef>
+          <a:fontRef idx="minor">
+            <a:schemeClr val="tx1"/>
+          </a:fontRef>
+        </p:style>
+      </p:cxnSp>
     </p:spTree>
     <p:extLst>
       <p:ext uri="{BB962C8B-B14F-4D97-AF65-F5344CB8AC3E}">
@@ -5148,6 +5303,123 @@
           <a:chExt cx="0" cy="0"/>
         </a:xfrm>
       </p:grpSpPr>
+      <p:sp>
+        <p:nvSpPr>
+          <p:cNvPr id="7" name="TextBox 6">
+            <a:extLst>
+              <a:ext uri="{FF2B5EF4-FFF2-40B4-BE49-F238E27FC236}">
+                <a16:creationId xmlns:a16="http://schemas.microsoft.com/office/drawing/2014/main" id="{6BB39F5A-A665-46D5-A2CD-6365FD0DE879}"/>
+              </a:ext>
+            </a:extLst>
+          </p:cNvPr>
+          <p:cNvSpPr txBox="1"/>
+          <p:nvPr/>
+        </p:nvSpPr>
+        <p:spPr>
+          <a:xfrm>
+            <a:off x="16146" y="105878"/>
+            <a:ext cx="3940246" cy="923330"/>
+          </a:xfrm>
+          <a:prstGeom prst="rect">
+            <a:avLst/>
+          </a:prstGeom>
+          <a:noFill/>
+        </p:spPr>
+        <p:txBody>
+          <a:bodyPr wrap="none" rtlCol="0">
+            <a:spAutoFit/>
+          </a:bodyPr>
+          <a:lstStyle/>
+          <a:p>
+            <a:r>
+              <a:rPr lang="en-US" b="1" dirty="0"/>
+              <a:t>Networks + Wearables</a:t>
+            </a:r>
+          </a:p>
+          <a:p>
+            <a:r>
+              <a:rPr lang="en-US" b="1" dirty="0">
+                <a:solidFill>
+                  <a:srgbClr val="FF0000"/>
+                </a:solidFill>
+              </a:rPr>
+              <a:t>Conclusion: Not a gap. Closely related…</a:t>
+            </a:r>
+          </a:p>
+          <a:p>
+            <a:endParaRPr lang="en-US" b="1" dirty="0"/>
+          </a:p>
+        </p:txBody>
+      </p:sp>
+      <p:pic>
+        <p:nvPicPr>
+          <p:cNvPr id="3" name="Graphic 2">
+            <a:extLst>
+              <a:ext uri="{FF2B5EF4-FFF2-40B4-BE49-F238E27FC236}">
+                <a16:creationId xmlns:a16="http://schemas.microsoft.com/office/drawing/2014/main" id="{A07414D9-AB23-4AD5-A5F5-6798C5D65E70}"/>
+              </a:ext>
+            </a:extLst>
+          </p:cNvPr>
+          <p:cNvPicPr>
+            <a:picLocks noChangeAspect="1"/>
+          </p:cNvPicPr>
+          <p:nvPr/>
+        </p:nvPicPr>
+        <p:blipFill>
+          <a:blip r:embed="rId2">
+            <a:extLst>
+              <a:ext uri="{28A0092B-C50C-407E-A947-70E740481C1C}">
+                <a14:useLocalDpi xmlns:a14="http://schemas.microsoft.com/office/drawing/2010/main" val="0"/>
+              </a:ext>
+              <a:ext uri="{96DAC541-7B7A-43D3-8B79-37D633B846F1}">
+                <asvg:svgBlip xmlns:asvg="http://schemas.microsoft.com/office/drawing/2016/SVG/main" r:embed="rId3"/>
+              </a:ext>
+            </a:extLst>
+          </a:blip>
+          <a:stretch>
+            <a:fillRect/>
+          </a:stretch>
+        </p:blipFill>
+        <p:spPr>
+          <a:xfrm>
+            <a:off x="926371" y="-1858935"/>
+            <a:ext cx="10652820" cy="12817297"/>
+          </a:xfrm>
+          <a:prstGeom prst="rect">
+            <a:avLst/>
+          </a:prstGeom>
+        </p:spPr>
+      </p:pic>
+    </p:spTree>
+    <p:extLst>
+      <p:ext uri="{BB962C8B-B14F-4D97-AF65-F5344CB8AC3E}">
+        <p14:creationId xmlns:p14="http://schemas.microsoft.com/office/powerpoint/2010/main" val="252229568"/>
+      </p:ext>
+    </p:extLst>
+  </p:cSld>
+  <p:clrMapOvr>
+    <a:masterClrMapping/>
+  </p:clrMapOvr>
+</p:sld>
+</file>
+
+<file path=ppt/slides/slide11.xml><?xml version="1.0" encoding="utf-8"?>
+<p:sld xmlns:a="http://schemas.openxmlformats.org/drawingml/2006/main" xmlns:r="http://schemas.openxmlformats.org/officeDocument/2006/relationships" xmlns:p="http://schemas.openxmlformats.org/presentationml/2006/main">
+  <p:cSld>
+    <p:spTree>
+      <p:nvGrpSpPr>
+        <p:cNvPr id="1" name=""/>
+        <p:cNvGrpSpPr/>
+        <p:nvPr/>
+      </p:nvGrpSpPr>
+      <p:grpSpPr>
+        <a:xfrm>
+          <a:off x="0" y="0"/>
+          <a:ext cx="0" cy="0"/>
+          <a:chOff x="0" y="0"/>
+          <a:chExt cx="0" cy="0"/>
+        </a:xfrm>
+      </p:grpSpPr>
       <p:pic>
         <p:nvPicPr>
           <p:cNvPr id="5" name="Content Placeholder 4">
@@ -5245,7 +5517,7 @@
 </p:sld>
 </file>
 
-<file path=ppt/slides/slide11.xml><?xml version="1.0" encoding="utf-8"?>
+<file path=ppt/slides/slide12.xml><?xml version="1.0" encoding="utf-8"?>
 <p:sld xmlns:a="http://schemas.openxmlformats.org/drawingml/2006/main" xmlns:r="http://schemas.openxmlformats.org/officeDocument/2006/relationships" xmlns:p="http://schemas.openxmlformats.org/presentationml/2006/main">
   <p:cSld>
     <p:spTree>
@@ -5957,12 +6229,60 @@
           <a:chExt cx="0" cy="0"/>
         </a:xfrm>
       </p:grpSpPr>
+      <p:sp>
+        <p:nvSpPr>
+          <p:cNvPr id="4" name="TextBox 3">
+            <a:extLst>
+              <a:ext uri="{FF2B5EF4-FFF2-40B4-BE49-F238E27FC236}">
+                <a16:creationId xmlns:a16="http://schemas.microsoft.com/office/drawing/2014/main" id="{801308F0-51F5-4616-A20F-FF2BB56F42F1}"/>
+              </a:ext>
+            </a:extLst>
+          </p:cNvPr>
+          <p:cNvSpPr txBox="1"/>
+          <p:nvPr/>
+        </p:nvSpPr>
+        <p:spPr>
+          <a:xfrm>
+            <a:off x="16146" y="105878"/>
+            <a:ext cx="4506490" cy="923330"/>
+          </a:xfrm>
+          <a:prstGeom prst="rect">
+            <a:avLst/>
+          </a:prstGeom>
+          <a:noFill/>
+        </p:spPr>
+        <p:txBody>
+          <a:bodyPr wrap="none" rtlCol="0">
+            <a:spAutoFit/>
+          </a:bodyPr>
+          <a:lstStyle/>
+          <a:p>
+            <a:r>
+              <a:rPr lang="en-US" b="1" dirty="0"/>
+              <a:t>Emergency Responders and Training</a:t>
+            </a:r>
+          </a:p>
+          <a:p>
+            <a:r>
+              <a:rPr lang="en-US" b="1" dirty="0">
+                <a:solidFill>
+                  <a:srgbClr val="FF0000"/>
+                </a:solidFill>
+              </a:rPr>
+              <a:t>Conclusion: Not a gap. Connected and “close”</a:t>
+            </a:r>
+          </a:p>
+          <a:p>
+            <a:endParaRPr lang="en-US" b="1" dirty="0"/>
+          </a:p>
+        </p:txBody>
+      </p:sp>
       <p:pic>
         <p:nvPicPr>
-          <p:cNvPr id="5" name="Content Placeholder 4">
-            <a:extLst>
-              <a:ext uri="{FF2B5EF4-FFF2-40B4-BE49-F238E27FC236}">
-                <a16:creationId xmlns:a16="http://schemas.microsoft.com/office/drawing/2014/main" id="{2CBE7724-942F-41B0-A8B6-4663EF956B4C}"/>
+          <p:cNvPr id="7" name="Content Placeholder 6">
+            <a:extLst>
+              <a:ext uri="{FF2B5EF4-FFF2-40B4-BE49-F238E27FC236}">
+                <a16:creationId xmlns:a16="http://schemas.microsoft.com/office/drawing/2014/main" id="{F900D4CE-24B6-4247-BD2D-8C84B22D727D}"/>
               </a:ext>
             </a:extLst>
           </p:cNvPr>
@@ -5990,63 +6310,15 @@
         </p:blipFill>
         <p:spPr>
           <a:xfrm>
-            <a:off x="2070176" y="-948136"/>
-            <a:ext cx="9283624" cy="9837902"/>
+            <a:off x="651935" y="-1007866"/>
+            <a:ext cx="8696500" cy="8590295"/>
           </a:xfrm>
         </p:spPr>
       </p:pic>
-      <p:sp>
-        <p:nvSpPr>
-          <p:cNvPr id="6" name="TextBox 5">
-            <a:extLst>
-              <a:ext uri="{FF2B5EF4-FFF2-40B4-BE49-F238E27FC236}">
-                <a16:creationId xmlns:a16="http://schemas.microsoft.com/office/drawing/2014/main" id="{08B57507-4D98-42E5-A2F6-1D1FC131A990}"/>
-              </a:ext>
-            </a:extLst>
-          </p:cNvPr>
-          <p:cNvSpPr txBox="1"/>
-          <p:nvPr/>
-        </p:nvSpPr>
-        <p:spPr>
-          <a:xfrm>
-            <a:off x="16146" y="105878"/>
-            <a:ext cx="3940246" cy="923330"/>
-          </a:xfrm>
-          <a:prstGeom prst="rect">
-            <a:avLst/>
-          </a:prstGeom>
-          <a:noFill/>
-        </p:spPr>
-        <p:txBody>
-          <a:bodyPr wrap="none" rtlCol="0">
-            <a:spAutoFit/>
-          </a:bodyPr>
-          <a:lstStyle/>
-          <a:p>
-            <a:r>
-              <a:rPr lang="en-US" b="1" dirty="0"/>
-              <a:t>IoT + Sensors</a:t>
-            </a:r>
-          </a:p>
-          <a:p>
-            <a:r>
-              <a:rPr lang="en-US" b="1" dirty="0">
-                <a:solidFill>
-                  <a:srgbClr val="FF0000"/>
-                </a:solidFill>
-              </a:rPr>
-              <a:t>Conclusion: Not a gap. Closely related…</a:t>
-            </a:r>
-          </a:p>
-          <a:p>
-            <a:endParaRPr lang="en-US" b="1" dirty="0"/>
-          </a:p>
-        </p:txBody>
-      </p:sp>
     </p:spTree>
     <p:extLst>
       <p:ext uri="{BB962C8B-B14F-4D97-AF65-F5344CB8AC3E}">
-        <p14:creationId xmlns:p14="http://schemas.microsoft.com/office/powerpoint/2010/main" val="3368470760"/>
+        <p14:creationId xmlns:p14="http://schemas.microsoft.com/office/powerpoint/2010/main" val="2519361529"/>
       </p:ext>
     </p:extLst>
   </p:cSld>
@@ -6073,12 +6345,50 @@
           <a:chExt cx="0" cy="0"/>
         </a:xfrm>
       </p:grpSpPr>
-      <p:sp>
-        <p:nvSpPr>
-          <p:cNvPr id="7" name="TextBox 6">
-            <a:extLst>
-              <a:ext uri="{FF2B5EF4-FFF2-40B4-BE49-F238E27FC236}">
-                <a16:creationId xmlns:a16="http://schemas.microsoft.com/office/drawing/2014/main" id="{6BB39F5A-A665-46D5-A2CD-6365FD0DE879}"/>
+      <p:pic>
+        <p:nvPicPr>
+          <p:cNvPr id="5" name="Content Placeholder 4">
+            <a:extLst>
+              <a:ext uri="{FF2B5EF4-FFF2-40B4-BE49-F238E27FC236}">
+                <a16:creationId xmlns:a16="http://schemas.microsoft.com/office/drawing/2014/main" id="{2CBE7724-942F-41B0-A8B6-4663EF956B4C}"/>
+              </a:ext>
+            </a:extLst>
+          </p:cNvPr>
+          <p:cNvPicPr>
+            <a:picLocks noGrp="1" noChangeAspect="1"/>
+          </p:cNvPicPr>
+          <p:nvPr>
+            <p:ph idx="1"/>
+          </p:nvPr>
+        </p:nvPicPr>
+        <p:blipFill>
+          <a:blip r:embed="rId2">
+            <a:extLst>
+              <a:ext uri="{28A0092B-C50C-407E-A947-70E740481C1C}">
+                <a14:useLocalDpi xmlns:a14="http://schemas.microsoft.com/office/drawing/2010/main" val="0"/>
+              </a:ext>
+              <a:ext uri="{96DAC541-7B7A-43D3-8B79-37D633B846F1}">
+                <asvg:svgBlip xmlns:asvg="http://schemas.microsoft.com/office/drawing/2016/SVG/main" r:embed="rId3"/>
+              </a:ext>
+            </a:extLst>
+          </a:blip>
+          <a:stretch>
+            <a:fillRect/>
+          </a:stretch>
+        </p:blipFill>
+        <p:spPr>
+          <a:xfrm>
+            <a:off x="2070176" y="-948136"/>
+            <a:ext cx="9283624" cy="9837902"/>
+          </a:xfrm>
+        </p:spPr>
+      </p:pic>
+      <p:sp>
+        <p:nvSpPr>
+          <p:cNvPr id="6" name="TextBox 5">
+            <a:extLst>
+              <a:ext uri="{FF2B5EF4-FFF2-40B4-BE49-F238E27FC236}">
+                <a16:creationId xmlns:a16="http://schemas.microsoft.com/office/drawing/2014/main" id="{08B57507-4D98-42E5-A2F6-1D1FC131A990}"/>
               </a:ext>
             </a:extLst>
           </p:cNvPr>
@@ -6103,7 +6413,7 @@
           <a:p>
             <a:r>
               <a:rPr lang="en-US" b="1" dirty="0"/>
-              <a:t>Input + Wearables</a:t>
+              <a:t>IoT + Sensors</a:t>
             </a:r>
           </a:p>
           <a:p>
@@ -6121,49 +6431,10 @@
           </a:p>
         </p:txBody>
       </p:sp>
-      <p:pic>
-        <p:nvPicPr>
-          <p:cNvPr id="11" name="Graphic 10">
-            <a:extLst>
-              <a:ext uri="{FF2B5EF4-FFF2-40B4-BE49-F238E27FC236}">
-                <a16:creationId xmlns:a16="http://schemas.microsoft.com/office/drawing/2014/main" id="{624234B1-0406-4909-A0F6-EADC5C15DA9B}"/>
-              </a:ext>
-            </a:extLst>
-          </p:cNvPr>
-          <p:cNvPicPr>
-            <a:picLocks noChangeAspect="1"/>
-          </p:cNvPicPr>
-          <p:nvPr/>
-        </p:nvPicPr>
-        <p:blipFill>
-          <a:blip r:embed="rId2">
-            <a:extLst>
-              <a:ext uri="{28A0092B-C50C-407E-A947-70E740481C1C}">
-                <a14:useLocalDpi xmlns:a14="http://schemas.microsoft.com/office/drawing/2010/main" val="0"/>
-              </a:ext>
-              <a:ext uri="{96DAC541-7B7A-43D3-8B79-37D633B846F1}">
-                <asvg:svgBlip xmlns:asvg="http://schemas.microsoft.com/office/drawing/2016/SVG/main" r:embed="rId3"/>
-              </a:ext>
-            </a:extLst>
-          </a:blip>
-          <a:stretch>
-            <a:fillRect/>
-          </a:stretch>
-        </p:blipFill>
-        <p:spPr>
-          <a:xfrm>
-            <a:off x="795868" y="-1807883"/>
-            <a:ext cx="10828402" cy="9923183"/>
-          </a:xfrm>
-          <a:prstGeom prst="rect">
-            <a:avLst/>
-          </a:prstGeom>
-        </p:spPr>
-      </p:pic>
     </p:spTree>
     <p:extLst>
       <p:ext uri="{BB962C8B-B14F-4D97-AF65-F5344CB8AC3E}">
-        <p14:creationId xmlns:p14="http://schemas.microsoft.com/office/powerpoint/2010/main" val="1829030809"/>
+        <p14:creationId xmlns:p14="http://schemas.microsoft.com/office/powerpoint/2010/main" val="3368470760"/>
       </p:ext>
     </p:extLst>
   </p:cSld>
@@ -6220,7 +6491,7 @@
           <a:p>
             <a:r>
               <a:rPr lang="en-US" b="1" dirty="0"/>
-              <a:t>Networks + Wearables</a:t>
+              <a:t>Input + Wearables</a:t>
             </a:r>
           </a:p>
           <a:p>
@@ -6240,10 +6511,10 @@
       </p:sp>
       <p:pic>
         <p:nvPicPr>
-          <p:cNvPr id="3" name="Graphic 2">
-            <a:extLst>
-              <a:ext uri="{FF2B5EF4-FFF2-40B4-BE49-F238E27FC236}">
-                <a16:creationId xmlns:a16="http://schemas.microsoft.com/office/drawing/2014/main" id="{A07414D9-AB23-4AD5-A5F5-6798C5D65E70}"/>
+          <p:cNvPr id="11" name="Graphic 10">
+            <a:extLst>
+              <a:ext uri="{FF2B5EF4-FFF2-40B4-BE49-F238E27FC236}">
+                <a16:creationId xmlns:a16="http://schemas.microsoft.com/office/drawing/2014/main" id="{624234B1-0406-4909-A0F6-EADC5C15DA9B}"/>
               </a:ext>
             </a:extLst>
           </p:cNvPr>
@@ -6269,8 +6540,8 @@
         </p:blipFill>
         <p:spPr>
           <a:xfrm>
-            <a:off x="926371" y="-1858935"/>
-            <a:ext cx="10652820" cy="12817297"/>
+            <a:off x="795868" y="-1807883"/>
+            <a:ext cx="10828402" cy="9923183"/>
           </a:xfrm>
           <a:prstGeom prst="rect">
             <a:avLst/>
@@ -6280,7 +6551,7 @@
     </p:spTree>
     <p:extLst>
       <p:ext uri="{BB962C8B-B14F-4D97-AF65-F5344CB8AC3E}">
-        <p14:creationId xmlns:p14="http://schemas.microsoft.com/office/powerpoint/2010/main" val="252229568"/>
+        <p14:creationId xmlns:p14="http://schemas.microsoft.com/office/powerpoint/2010/main" val="1829030809"/>
       </p:ext>
     </p:extLst>
   </p:cSld>

</xml_diff>